<commit_message>
Fix a figure of system model
</commit_message>
<xml_diff>
--- a/master/figure/SystemModel.pptx
+++ b/master/figure/SystemModel.pptx
@@ -197,7 +197,7 @@
           <a:p>
             <a:fld id="{00D06802-B8EF-4FD8-9511-F1F928CF3A55}" type="datetimeFigureOut">
               <a:rPr kumimoji="1" lang="ja-JP" altLang="en-US" smtClean="0"/>
-              <a:t>2017/11/16</a:t>
+              <a:t>2018/1/11</a:t>
             </a:fld>
             <a:endParaRPr kumimoji="1" lang="ja-JP" altLang="en-US"/>
           </a:p>
@@ -628,7 +628,7 @@
           <a:p>
             <a:fld id="{AA641DB4-C951-4763-94FC-F650C3AA7E65}" type="datetimeFigureOut">
               <a:rPr kumimoji="1" lang="ja-JP" altLang="en-US" smtClean="0"/>
-              <a:t>2017/11/16</a:t>
+              <a:t>2018/1/11</a:t>
             </a:fld>
             <a:endParaRPr kumimoji="1" lang="ja-JP" altLang="en-US"/>
           </a:p>
@@ -830,7 +830,7 @@
           <a:p>
             <a:fld id="{AA641DB4-C951-4763-94FC-F650C3AA7E65}" type="datetimeFigureOut">
               <a:rPr kumimoji="1" lang="ja-JP" altLang="en-US" smtClean="0"/>
-              <a:t>2017/11/16</a:t>
+              <a:t>2018/1/11</a:t>
             </a:fld>
             <a:endParaRPr kumimoji="1" lang="ja-JP" altLang="en-US"/>
           </a:p>
@@ -1042,7 +1042,7 @@
           <a:p>
             <a:fld id="{AA641DB4-C951-4763-94FC-F650C3AA7E65}" type="datetimeFigureOut">
               <a:rPr kumimoji="1" lang="ja-JP" altLang="en-US" smtClean="0"/>
-              <a:t>2017/11/16</a:t>
+              <a:t>2018/1/11</a:t>
             </a:fld>
             <a:endParaRPr kumimoji="1" lang="ja-JP" altLang="en-US"/>
           </a:p>
@@ -1244,7 +1244,7 @@
           <a:p>
             <a:fld id="{AA641DB4-C951-4763-94FC-F650C3AA7E65}" type="datetimeFigureOut">
               <a:rPr kumimoji="1" lang="ja-JP" altLang="en-US" smtClean="0"/>
-              <a:t>2017/11/16</a:t>
+              <a:t>2018/1/11</a:t>
             </a:fld>
             <a:endParaRPr kumimoji="1" lang="ja-JP" altLang="en-US"/>
           </a:p>
@@ -1490,7 +1490,7 @@
           <a:p>
             <a:fld id="{AA641DB4-C951-4763-94FC-F650C3AA7E65}" type="datetimeFigureOut">
               <a:rPr kumimoji="1" lang="ja-JP" altLang="en-US" smtClean="0"/>
-              <a:t>2017/11/16</a:t>
+              <a:t>2018/1/11</a:t>
             </a:fld>
             <a:endParaRPr kumimoji="1" lang="ja-JP" altLang="en-US"/>
           </a:p>
@@ -1786,7 +1786,7 @@
           <a:p>
             <a:fld id="{AA641DB4-C951-4763-94FC-F650C3AA7E65}" type="datetimeFigureOut">
               <a:rPr kumimoji="1" lang="ja-JP" altLang="en-US" smtClean="0"/>
-              <a:t>2017/11/16</a:t>
+              <a:t>2018/1/11</a:t>
             </a:fld>
             <a:endParaRPr kumimoji="1" lang="ja-JP" altLang="en-US"/>
           </a:p>
@@ -2217,7 +2217,7 @@
           <a:p>
             <a:fld id="{AA641DB4-C951-4763-94FC-F650C3AA7E65}" type="datetimeFigureOut">
               <a:rPr kumimoji="1" lang="ja-JP" altLang="en-US" smtClean="0"/>
-              <a:t>2017/11/16</a:t>
+              <a:t>2018/1/11</a:t>
             </a:fld>
             <a:endParaRPr kumimoji="1" lang="ja-JP" altLang="en-US"/>
           </a:p>
@@ -2335,7 +2335,7 @@
           <a:p>
             <a:fld id="{AA641DB4-C951-4763-94FC-F650C3AA7E65}" type="datetimeFigureOut">
               <a:rPr kumimoji="1" lang="ja-JP" altLang="en-US" smtClean="0"/>
-              <a:t>2017/11/16</a:t>
+              <a:t>2018/1/11</a:t>
             </a:fld>
             <a:endParaRPr kumimoji="1" lang="ja-JP" altLang="en-US"/>
           </a:p>
@@ -2430,7 +2430,7 @@
           <a:p>
             <a:fld id="{AA641DB4-C951-4763-94FC-F650C3AA7E65}" type="datetimeFigureOut">
               <a:rPr kumimoji="1" lang="ja-JP" altLang="en-US" smtClean="0"/>
-              <a:t>2017/11/16</a:t>
+              <a:t>2018/1/11</a:t>
             </a:fld>
             <a:endParaRPr kumimoji="1" lang="ja-JP" altLang="en-US"/>
           </a:p>
@@ -2739,7 +2739,7 @@
           <a:p>
             <a:fld id="{AA641DB4-C951-4763-94FC-F650C3AA7E65}" type="datetimeFigureOut">
               <a:rPr kumimoji="1" lang="ja-JP" altLang="en-US" smtClean="0"/>
-              <a:t>2017/11/16</a:t>
+              <a:t>2018/1/11</a:t>
             </a:fld>
             <a:endParaRPr kumimoji="1" lang="ja-JP" altLang="en-US"/>
           </a:p>
@@ -2996,7 +2996,7 @@
           <a:p>
             <a:fld id="{AA641DB4-C951-4763-94FC-F650C3AA7E65}" type="datetimeFigureOut">
               <a:rPr kumimoji="1" lang="ja-JP" altLang="en-US" smtClean="0"/>
-              <a:t>2017/11/16</a:t>
+              <a:t>2018/1/11</a:t>
             </a:fld>
             <a:endParaRPr kumimoji="1" lang="ja-JP" altLang="en-US"/>
           </a:p>
@@ -3241,7 +3241,7 @@
           <a:p>
             <a:fld id="{AA641DB4-C951-4763-94FC-F650C3AA7E65}" type="datetimeFigureOut">
               <a:rPr kumimoji="1" lang="ja-JP" altLang="en-US" smtClean="0"/>
-              <a:t>2017/11/16</a:t>
+              <a:t>2018/1/11</a:t>
             </a:fld>
             <a:endParaRPr kumimoji="1" lang="ja-JP" altLang="en-US"/>
           </a:p>
@@ -4063,15 +4063,7 @@
                     <a:ea typeface="メイリオ" panose="020B0604030504040204" pitchFamily="50" charset="-128"/>
                     <a:cs typeface="メイリオ" pitchFamily="50" charset="-128"/>
                   </a:rPr>
-                  <a:t>				</a:t>
-                </a:r>
-                <a:r>
-                  <a:rPr lang="en-US" altLang="ja-JP" sz="2400" dirty="0">
-                    <a:latin typeface="メイリオ" panose="020B0604030504040204" pitchFamily="50" charset="-128"/>
-                    <a:ea typeface="メイリオ" panose="020B0604030504040204" pitchFamily="50" charset="-128"/>
-                    <a:cs typeface="メイリオ" pitchFamily="50" charset="-128"/>
-                  </a:rPr>
-                  <a:t>				</a:t>
+                  <a:t>								</a:t>
                 </a:r>
                 <a:r>
                   <a:rPr lang="en-US" altLang="ja-JP" sz="4800" dirty="0">
@@ -4171,15 +4163,7 @@
                     <a:ea typeface="メイリオ" panose="020B0604030504040204" pitchFamily="50" charset="-128"/>
                     <a:cs typeface="メイリオ" pitchFamily="50" charset="-128"/>
                   </a:rPr>
-                  <a:t>Native </a:t>
-                </a:r>
-                <a:r>
-                  <a:rPr lang="en-US" altLang="ja-JP" sz="4800" dirty="0">
-                    <a:latin typeface="メイリオ" panose="020B0604030504040204" pitchFamily="50" charset="-128"/>
-                    <a:ea typeface="メイリオ" panose="020B0604030504040204" pitchFamily="50" charset="-128"/>
-                    <a:cs typeface="メイリオ" pitchFamily="50" charset="-128"/>
-                  </a:rPr>
-                  <a:t>/ mruby </a:t>
+                  <a:t>Native / mruby </a:t>
                 </a:r>
               </a:p>
               <a:p>
@@ -4259,21 +4243,8 @@
                     <a:ea typeface="メイリオ" panose="020B0604030504040204" pitchFamily="50" charset="-128"/>
                     <a:cs typeface="メイリオ" panose="020B0604030504040204" pitchFamily="50" charset="-128"/>
                   </a:rPr>
-                  <a:t>RTOS (</a:t>
+                  <a:t>RTOS (TOPPERS/ASP3)</a:t>
                 </a:r>
-                <a:r>
-                  <a:rPr lang="en-US" altLang="ja-JP" sz="4800" dirty="0">
-                    <a:latin typeface="メイリオ" panose="020B0604030504040204" pitchFamily="50" charset="-128"/>
-                    <a:ea typeface="メイリオ" panose="020B0604030504040204" pitchFamily="50" charset="-128"/>
-                    <a:cs typeface="メイリオ" panose="020B0604030504040204" pitchFamily="50" charset="-128"/>
-                  </a:rPr>
-                  <a:t>TOPPERS/ASP3)</a:t>
-                </a:r>
-                <a:endParaRPr lang="en-US" altLang="ja-JP" sz="4800" dirty="0">
-                  <a:latin typeface="メイリオ" panose="020B0604030504040204" pitchFamily="50" charset="-128"/>
-                  <a:ea typeface="メイリオ" panose="020B0604030504040204" pitchFamily="50" charset="-128"/>
-                  <a:cs typeface="メイリオ" panose="020B0604030504040204" pitchFamily="50" charset="-128"/>
-                </a:endParaRPr>
               </a:p>
             </p:txBody>
           </p:sp>
@@ -4329,21 +4300,8 @@
                     <a:ea typeface="メイリオ" panose="020B0604030504040204" pitchFamily="50" charset="-128"/>
                     <a:cs typeface="メイリオ" panose="020B0604030504040204" pitchFamily="50" charset="-128"/>
                   </a:rPr>
-                  <a:t>Target </a:t>
+                  <a:t>Target Hardware (GR-PEACH)</a:t>
                 </a:r>
-                <a:r>
-                  <a:rPr lang="en-US" altLang="ja-JP" sz="4800" dirty="0">
-                    <a:latin typeface="メイリオ" panose="020B0604030504040204" pitchFamily="50" charset="-128"/>
-                    <a:ea typeface="メイリオ" panose="020B0604030504040204" pitchFamily="50" charset="-128"/>
-                    <a:cs typeface="メイリオ" panose="020B0604030504040204" pitchFamily="50" charset="-128"/>
-                  </a:rPr>
-                  <a:t>Hardware (GR-PEACH)</a:t>
-                </a:r>
-                <a:endParaRPr lang="en-US" altLang="ja-JP" sz="4800" dirty="0">
-                  <a:latin typeface="メイリオ" panose="020B0604030504040204" pitchFamily="50" charset="-128"/>
-                  <a:ea typeface="メイリオ" panose="020B0604030504040204" pitchFamily="50" charset="-128"/>
-                  <a:cs typeface="メイリオ" panose="020B0604030504040204" pitchFamily="50" charset="-128"/>
-                </a:endParaRPr>
               </a:p>
             </p:txBody>
           </p:sp>
@@ -4928,8 +4886,8 @@
         </p:nvSpPr>
         <p:spPr>
           <a:xfrm>
-            <a:off x="14930451" y="459668"/>
-            <a:ext cx="3172084" cy="1123712"/>
+            <a:off x="14004758" y="484462"/>
+            <a:ext cx="4740442" cy="1123712"/>
           </a:xfrm>
           <a:prstGeom prst="roundRect">
             <a:avLst/>
@@ -4946,22 +4904,31 @@
           </a:ln>
         </p:spPr>
         <p:txBody>
-          <a:bodyPr wrap="square">
+          <a:bodyPr wrap="square" anchor="ctr" anchorCtr="0">
             <a:spAutoFit/>
           </a:bodyPr>
           <a:lstStyle/>
           <a:p>
-            <a:r>
-              <a:rPr lang="en-US" altLang="ja-JP" sz="6000" kern="100" dirty="0">
-                <a:latin typeface="Century" panose="02040604050505020304" pitchFamily="18" charset="0"/>
-                <a:ea typeface="ＭＳ 明朝" panose="02020609040205080304" pitchFamily="17" charset="-128"/>
+            <a:pPr algn="ctr"/>
+            <a:r>
+              <a:rPr lang="en-US" altLang="ja-JP" sz="6000" kern="100" dirty="0" smtClean="0">
+                <a:latin typeface="メイリオ" panose="020B0604030504040204" pitchFamily="50" charset="-128"/>
+                <a:ea typeface="メイリオ" panose="020B0604030504040204" pitchFamily="50" charset="-128"/>
                 <a:cs typeface="Times New Roman" panose="02020603050405020304" pitchFamily="18" charset="0"/>
               </a:rPr>
-              <a:t>Sec. 3.1</a:t>
+              <a:t>Chapter </a:t>
+            </a:r>
+            <a:r>
+              <a:rPr lang="en-US" altLang="ja-JP" sz="6000" kern="100" dirty="0">
+                <a:latin typeface="メイリオ" panose="020B0604030504040204" pitchFamily="50" charset="-128"/>
+                <a:ea typeface="メイリオ" panose="020B0604030504040204" pitchFamily="50" charset="-128"/>
+                <a:cs typeface="Times New Roman" panose="02020603050405020304" pitchFamily="18" charset="0"/>
+              </a:rPr>
+              <a:t>3.1</a:t>
             </a:r>
             <a:endParaRPr lang="ja-JP" altLang="ja-JP" sz="6000" kern="100" dirty="0">
-              <a:latin typeface="Century" panose="02040604050505020304" pitchFamily="18" charset="0"/>
-              <a:ea typeface="ＭＳ 明朝" panose="02020609040205080304" pitchFamily="17" charset="-128"/>
+              <a:latin typeface="メイリオ" panose="020B0604030504040204" pitchFamily="50" charset="-128"/>
+              <a:ea typeface="メイリオ" panose="020B0604030504040204" pitchFamily="50" charset="-128"/>
               <a:cs typeface="Times New Roman" panose="02020603050405020304" pitchFamily="18" charset="0"/>
             </a:endParaRPr>
           </a:p>
@@ -4969,14 +4936,14 @@
       </p:sp>
       <p:sp>
         <p:nvSpPr>
-          <p:cNvPr id="23" name="角丸四角形 22"/>
+          <p:cNvPr id="24" name="角丸四角形 23"/>
           <p:cNvSpPr/>
           <p:nvPr/>
         </p:nvSpPr>
         <p:spPr>
           <a:xfrm>
-            <a:off x="436592" y="7821781"/>
-            <a:ext cx="3172084" cy="1123712"/>
+            <a:off x="410098" y="7768351"/>
+            <a:ext cx="4740442" cy="1123712"/>
           </a:xfrm>
           <a:prstGeom prst="roundRect">
             <a:avLst/>
@@ -4993,22 +4960,23 @@
           </a:ln>
         </p:spPr>
         <p:txBody>
-          <a:bodyPr wrap="square">
+          <a:bodyPr wrap="square" anchor="ctr" anchorCtr="0">
             <a:spAutoFit/>
           </a:bodyPr>
           <a:lstStyle/>
           <a:p>
-            <a:r>
-              <a:rPr lang="en-US" altLang="ja-JP" sz="6000" kern="100" dirty="0">
-                <a:latin typeface="Century" panose="02040604050505020304" pitchFamily="18" charset="0"/>
-                <a:ea typeface="ＭＳ 明朝" panose="02020609040205080304" pitchFamily="17" charset="-128"/>
+            <a:pPr algn="ctr"/>
+            <a:r>
+              <a:rPr lang="en-US" altLang="ja-JP" sz="6000" kern="100" dirty="0" smtClean="0">
+                <a:latin typeface="メイリオ" panose="020B0604030504040204" pitchFamily="50" charset="-128"/>
+                <a:ea typeface="メイリオ" panose="020B0604030504040204" pitchFamily="50" charset="-128"/>
                 <a:cs typeface="Times New Roman" panose="02020603050405020304" pitchFamily="18" charset="0"/>
               </a:rPr>
-              <a:t>Sec. 3.2</a:t>
+              <a:t>Chapter 3.2</a:t>
             </a:r>
             <a:endParaRPr lang="ja-JP" altLang="ja-JP" sz="6000" kern="100" dirty="0">
-              <a:latin typeface="Century" panose="02040604050505020304" pitchFamily="18" charset="0"/>
-              <a:ea typeface="ＭＳ 明朝" panose="02020609040205080304" pitchFamily="17" charset="-128"/>
+              <a:latin typeface="メイリオ" panose="020B0604030504040204" pitchFamily="50" charset="-128"/>
+              <a:ea typeface="メイリオ" panose="020B0604030504040204" pitchFamily="50" charset="-128"/>
               <a:cs typeface="Times New Roman" panose="02020603050405020304" pitchFamily="18" charset="0"/>
             </a:endParaRPr>
           </a:p>

</xml_diff>